<commit_message>
Update SAPlexa Präsentation FINAL.pptx
</commit_message>
<xml_diff>
--- a/CavallaroAngelo/Präsentation Wahlmodulvorstellung/SAPlexa Präsentation FINAL.pptx
+++ b/CavallaroAngelo/Präsentation Wahlmodulvorstellung/SAPlexa Präsentation FINAL.pptx
@@ -10,22 +10,22 @@
   <p:sldIdLst>
     <p:sldId id="256" r:id="rId2"/>
     <p:sldId id="266" r:id="rId3"/>
-    <p:sldId id="297" r:id="rId4"/>
+    <p:sldId id="298" r:id="rId4"/>
     <p:sldId id="259" r:id="rId5"/>
-    <p:sldId id="296" r:id="rId6"/>
+    <p:sldId id="299" r:id="rId6"/>
     <p:sldId id="278" r:id="rId7"/>
     <p:sldId id="277" r:id="rId8"/>
     <p:sldId id="279" r:id="rId9"/>
     <p:sldId id="281" r:id="rId10"/>
-    <p:sldId id="287" r:id="rId11"/>
+    <p:sldId id="300" r:id="rId11"/>
     <p:sldId id="267" r:id="rId12"/>
     <p:sldId id="291" r:id="rId13"/>
     <p:sldId id="292" r:id="rId14"/>
-    <p:sldId id="294" r:id="rId15"/>
+    <p:sldId id="301" r:id="rId15"/>
     <p:sldId id="272" r:id="rId16"/>
     <p:sldId id="282" r:id="rId17"/>
     <p:sldId id="283" r:id="rId18"/>
-    <p:sldId id="295" r:id="rId19"/>
+    <p:sldId id="302" r:id="rId19"/>
     <p:sldId id="293" r:id="rId20"/>
     <p:sldId id="274" r:id="rId21"/>
     <p:sldId id="275" r:id="rId22"/>
@@ -12628,12 +12628,19 @@
         </dgm:presLayoutVars>
       </dgm:prSet>
       <dgm:spPr/>
+      <dgm:t>
+        <a:bodyPr/>
+        <a:lstStyle/>
+        <a:p>
+          <a:endParaRPr lang="de-DE"/>
+        </a:p>
+      </dgm:t>
     </dgm:pt>
   </dgm:ptLst>
   <dgm:cxnLst>
+    <dgm:cxn modelId="{3EFB67F2-B4EB-4EFE-964A-8AF193349332}" type="presOf" srcId="{674503E8-1AC7-41ED-8605-5E819E9C237D}" destId="{B2AC34C9-27F4-4A43-B9E6-31AAF7FDE0CB}" srcOrd="0" destOrd="0" presId="urn:microsoft.com/office/officeart/2005/8/layout/chevron1"/>
     <dgm:cxn modelId="{6D139A0C-1C5F-462F-941A-E83A5038A582}" type="presOf" srcId="{5033FB32-F740-4C19-B504-0647C1F53E48}" destId="{3EB30996-91B3-4239-BF37-88E3C555BC52}" srcOrd="0" destOrd="0" presId="urn:microsoft.com/office/officeart/2005/8/layout/chevron1"/>
     <dgm:cxn modelId="{A9C04542-76A5-484F-BDC6-8684DE3831C0}" srcId="{674503E8-1AC7-41ED-8605-5E819E9C237D}" destId="{5033FB32-F740-4C19-B504-0647C1F53E48}" srcOrd="0" destOrd="0" parTransId="{4F5440BC-E4ED-41F4-BCBC-91A4379FE628}" sibTransId="{0F72E487-3666-4627-B648-0F027167834A}"/>
-    <dgm:cxn modelId="{3EFB67F2-B4EB-4EFE-964A-8AF193349332}" type="presOf" srcId="{674503E8-1AC7-41ED-8605-5E819E9C237D}" destId="{B2AC34C9-27F4-4A43-B9E6-31AAF7FDE0CB}" srcOrd="0" destOrd="0" presId="urn:microsoft.com/office/officeart/2005/8/layout/chevron1"/>
     <dgm:cxn modelId="{E75CA34E-81F5-42E1-938A-72E2F0999817}" type="presParOf" srcId="{B2AC34C9-27F4-4A43-B9E6-31AAF7FDE0CB}" destId="{3EB30996-91B3-4239-BF37-88E3C555BC52}" srcOrd="0" destOrd="0" presId="urn:microsoft.com/office/officeart/2005/8/layout/chevron1"/>
   </dgm:cxnLst>
   <dgm:bg/>
@@ -12716,12 +12723,19 @@
         </dgm:presLayoutVars>
       </dgm:prSet>
       <dgm:spPr/>
+      <dgm:t>
+        <a:bodyPr/>
+        <a:lstStyle/>
+        <a:p>
+          <a:endParaRPr lang="de-DE"/>
+        </a:p>
+      </dgm:t>
     </dgm:pt>
   </dgm:ptLst>
   <dgm:cxnLst>
+    <dgm:cxn modelId="{3EFB67F2-B4EB-4EFE-964A-8AF193349332}" type="presOf" srcId="{674503E8-1AC7-41ED-8605-5E819E9C237D}" destId="{B2AC34C9-27F4-4A43-B9E6-31AAF7FDE0CB}" srcOrd="0" destOrd="0" presId="urn:microsoft.com/office/officeart/2005/8/layout/chevron1"/>
     <dgm:cxn modelId="{6D139A0C-1C5F-462F-941A-E83A5038A582}" type="presOf" srcId="{5033FB32-F740-4C19-B504-0647C1F53E48}" destId="{3EB30996-91B3-4239-BF37-88E3C555BC52}" srcOrd="0" destOrd="0" presId="urn:microsoft.com/office/officeart/2005/8/layout/chevron1"/>
     <dgm:cxn modelId="{A9C04542-76A5-484F-BDC6-8684DE3831C0}" srcId="{674503E8-1AC7-41ED-8605-5E819E9C237D}" destId="{5033FB32-F740-4C19-B504-0647C1F53E48}" srcOrd="0" destOrd="0" parTransId="{4F5440BC-E4ED-41F4-BCBC-91A4379FE628}" sibTransId="{0F72E487-3666-4627-B648-0F027167834A}"/>
-    <dgm:cxn modelId="{3EFB67F2-B4EB-4EFE-964A-8AF193349332}" type="presOf" srcId="{674503E8-1AC7-41ED-8605-5E819E9C237D}" destId="{B2AC34C9-27F4-4A43-B9E6-31AAF7FDE0CB}" srcOrd="0" destOrd="0" presId="urn:microsoft.com/office/officeart/2005/8/layout/chevron1"/>
     <dgm:cxn modelId="{E75CA34E-81F5-42E1-938A-72E2F0999817}" type="presParOf" srcId="{B2AC34C9-27F4-4A43-B9E6-31AAF7FDE0CB}" destId="{3EB30996-91B3-4239-BF37-88E3C555BC52}" srcOrd="0" destOrd="0" presId="urn:microsoft.com/office/officeart/2005/8/layout/chevron1"/>
   </dgm:cxnLst>
   <dgm:bg/>
@@ -12804,12 +12818,19 @@
         </dgm:presLayoutVars>
       </dgm:prSet>
       <dgm:spPr/>
+      <dgm:t>
+        <a:bodyPr/>
+        <a:lstStyle/>
+        <a:p>
+          <a:endParaRPr lang="de-DE"/>
+        </a:p>
+      </dgm:t>
     </dgm:pt>
   </dgm:ptLst>
   <dgm:cxnLst>
+    <dgm:cxn modelId="{3EFB67F2-B4EB-4EFE-964A-8AF193349332}" type="presOf" srcId="{674503E8-1AC7-41ED-8605-5E819E9C237D}" destId="{B2AC34C9-27F4-4A43-B9E6-31AAF7FDE0CB}" srcOrd="0" destOrd="0" presId="urn:microsoft.com/office/officeart/2005/8/layout/chevron1"/>
     <dgm:cxn modelId="{6D139A0C-1C5F-462F-941A-E83A5038A582}" type="presOf" srcId="{5033FB32-F740-4C19-B504-0647C1F53E48}" destId="{3EB30996-91B3-4239-BF37-88E3C555BC52}" srcOrd="0" destOrd="0" presId="urn:microsoft.com/office/officeart/2005/8/layout/chevron1"/>
     <dgm:cxn modelId="{A9C04542-76A5-484F-BDC6-8684DE3831C0}" srcId="{674503E8-1AC7-41ED-8605-5E819E9C237D}" destId="{5033FB32-F740-4C19-B504-0647C1F53E48}" srcOrd="0" destOrd="0" parTransId="{4F5440BC-E4ED-41F4-BCBC-91A4379FE628}" sibTransId="{0F72E487-3666-4627-B648-0F027167834A}"/>
-    <dgm:cxn modelId="{3EFB67F2-B4EB-4EFE-964A-8AF193349332}" type="presOf" srcId="{674503E8-1AC7-41ED-8605-5E819E9C237D}" destId="{B2AC34C9-27F4-4A43-B9E6-31AAF7FDE0CB}" srcOrd="0" destOrd="0" presId="urn:microsoft.com/office/officeart/2005/8/layout/chevron1"/>
     <dgm:cxn modelId="{E75CA34E-81F5-42E1-938A-72E2F0999817}" type="presParOf" srcId="{B2AC34C9-27F4-4A43-B9E6-31AAF7FDE0CB}" destId="{3EB30996-91B3-4239-BF37-88E3C555BC52}" srcOrd="0" destOrd="0" presId="urn:microsoft.com/office/officeart/2005/8/layout/chevron1"/>
   </dgm:cxnLst>
   <dgm:bg/>
@@ -12892,12 +12913,19 @@
         </dgm:presLayoutVars>
       </dgm:prSet>
       <dgm:spPr/>
+      <dgm:t>
+        <a:bodyPr/>
+        <a:lstStyle/>
+        <a:p>
+          <a:endParaRPr lang="de-DE"/>
+        </a:p>
+      </dgm:t>
     </dgm:pt>
   </dgm:ptLst>
   <dgm:cxnLst>
+    <dgm:cxn modelId="{3EFB67F2-B4EB-4EFE-964A-8AF193349332}" type="presOf" srcId="{674503E8-1AC7-41ED-8605-5E819E9C237D}" destId="{B2AC34C9-27F4-4A43-B9E6-31AAF7FDE0CB}" srcOrd="0" destOrd="0" presId="urn:microsoft.com/office/officeart/2005/8/layout/chevron1"/>
     <dgm:cxn modelId="{6D139A0C-1C5F-462F-941A-E83A5038A582}" type="presOf" srcId="{5033FB32-F740-4C19-B504-0647C1F53E48}" destId="{3EB30996-91B3-4239-BF37-88E3C555BC52}" srcOrd="0" destOrd="0" presId="urn:microsoft.com/office/officeart/2005/8/layout/chevron1"/>
     <dgm:cxn modelId="{A9C04542-76A5-484F-BDC6-8684DE3831C0}" srcId="{674503E8-1AC7-41ED-8605-5E819E9C237D}" destId="{5033FB32-F740-4C19-B504-0647C1F53E48}" srcOrd="0" destOrd="0" parTransId="{4F5440BC-E4ED-41F4-BCBC-91A4379FE628}" sibTransId="{0F72E487-3666-4627-B648-0F027167834A}"/>
-    <dgm:cxn modelId="{3EFB67F2-B4EB-4EFE-964A-8AF193349332}" type="presOf" srcId="{674503E8-1AC7-41ED-8605-5E819E9C237D}" destId="{B2AC34C9-27F4-4A43-B9E6-31AAF7FDE0CB}" srcOrd="0" destOrd="0" presId="urn:microsoft.com/office/officeart/2005/8/layout/chevron1"/>
     <dgm:cxn modelId="{E75CA34E-81F5-42E1-938A-72E2F0999817}" type="presParOf" srcId="{B2AC34C9-27F4-4A43-B9E6-31AAF7FDE0CB}" destId="{3EB30996-91B3-4239-BF37-88E3C555BC52}" srcOrd="0" destOrd="0" presId="urn:microsoft.com/office/officeart/2005/8/layout/chevron1"/>
   </dgm:cxnLst>
   <dgm:bg/>
@@ -12980,12 +13008,19 @@
         </dgm:presLayoutVars>
       </dgm:prSet>
       <dgm:spPr/>
+      <dgm:t>
+        <a:bodyPr/>
+        <a:lstStyle/>
+        <a:p>
+          <a:endParaRPr lang="de-DE"/>
+        </a:p>
+      </dgm:t>
     </dgm:pt>
   </dgm:ptLst>
   <dgm:cxnLst>
+    <dgm:cxn modelId="{3EFB67F2-B4EB-4EFE-964A-8AF193349332}" type="presOf" srcId="{674503E8-1AC7-41ED-8605-5E819E9C237D}" destId="{B2AC34C9-27F4-4A43-B9E6-31AAF7FDE0CB}" srcOrd="0" destOrd="0" presId="urn:microsoft.com/office/officeart/2005/8/layout/chevron1"/>
     <dgm:cxn modelId="{6D139A0C-1C5F-462F-941A-E83A5038A582}" type="presOf" srcId="{5033FB32-F740-4C19-B504-0647C1F53E48}" destId="{3EB30996-91B3-4239-BF37-88E3C555BC52}" srcOrd="0" destOrd="0" presId="urn:microsoft.com/office/officeart/2005/8/layout/chevron1"/>
     <dgm:cxn modelId="{A9C04542-76A5-484F-BDC6-8684DE3831C0}" srcId="{674503E8-1AC7-41ED-8605-5E819E9C237D}" destId="{5033FB32-F740-4C19-B504-0647C1F53E48}" srcOrd="0" destOrd="0" parTransId="{4F5440BC-E4ED-41F4-BCBC-91A4379FE628}" sibTransId="{0F72E487-3666-4627-B648-0F027167834A}"/>
-    <dgm:cxn modelId="{3EFB67F2-B4EB-4EFE-964A-8AF193349332}" type="presOf" srcId="{674503E8-1AC7-41ED-8605-5E819E9C237D}" destId="{B2AC34C9-27F4-4A43-B9E6-31AAF7FDE0CB}" srcOrd="0" destOrd="0" presId="urn:microsoft.com/office/officeart/2005/8/layout/chevron1"/>
     <dgm:cxn modelId="{E75CA34E-81F5-42E1-938A-72E2F0999817}" type="presParOf" srcId="{B2AC34C9-27F4-4A43-B9E6-31AAF7FDE0CB}" destId="{3EB30996-91B3-4239-BF37-88E3C555BC52}" srcOrd="0" destOrd="0" presId="urn:microsoft.com/office/officeart/2005/8/layout/chevron1"/>
   </dgm:cxnLst>
   <dgm:bg/>
@@ -13068,12 +13103,19 @@
         </dgm:presLayoutVars>
       </dgm:prSet>
       <dgm:spPr/>
+      <dgm:t>
+        <a:bodyPr/>
+        <a:lstStyle/>
+        <a:p>
+          <a:endParaRPr lang="de-DE"/>
+        </a:p>
+      </dgm:t>
     </dgm:pt>
   </dgm:ptLst>
   <dgm:cxnLst>
+    <dgm:cxn modelId="{3EFB67F2-B4EB-4EFE-964A-8AF193349332}" type="presOf" srcId="{674503E8-1AC7-41ED-8605-5E819E9C237D}" destId="{B2AC34C9-27F4-4A43-B9E6-31AAF7FDE0CB}" srcOrd="0" destOrd="0" presId="urn:microsoft.com/office/officeart/2005/8/layout/chevron1"/>
     <dgm:cxn modelId="{6D139A0C-1C5F-462F-941A-E83A5038A582}" type="presOf" srcId="{5033FB32-F740-4C19-B504-0647C1F53E48}" destId="{3EB30996-91B3-4239-BF37-88E3C555BC52}" srcOrd="0" destOrd="0" presId="urn:microsoft.com/office/officeart/2005/8/layout/chevron1"/>
     <dgm:cxn modelId="{A9C04542-76A5-484F-BDC6-8684DE3831C0}" srcId="{674503E8-1AC7-41ED-8605-5E819E9C237D}" destId="{5033FB32-F740-4C19-B504-0647C1F53E48}" srcOrd="0" destOrd="0" parTransId="{4F5440BC-E4ED-41F4-BCBC-91A4379FE628}" sibTransId="{0F72E487-3666-4627-B648-0F027167834A}"/>
-    <dgm:cxn modelId="{3EFB67F2-B4EB-4EFE-964A-8AF193349332}" type="presOf" srcId="{674503E8-1AC7-41ED-8605-5E819E9C237D}" destId="{B2AC34C9-27F4-4A43-B9E6-31AAF7FDE0CB}" srcOrd="0" destOrd="0" presId="urn:microsoft.com/office/officeart/2005/8/layout/chevron1"/>
     <dgm:cxn modelId="{E75CA34E-81F5-42E1-938A-72E2F0999817}" type="presParOf" srcId="{B2AC34C9-27F4-4A43-B9E6-31AAF7FDE0CB}" destId="{3EB30996-91B3-4239-BF37-88E3C555BC52}" srcOrd="0" destOrd="0" presId="urn:microsoft.com/office/officeart/2005/8/layout/chevron1"/>
   </dgm:cxnLst>
   <dgm:bg/>
@@ -13156,12 +13198,19 @@
         </dgm:presLayoutVars>
       </dgm:prSet>
       <dgm:spPr/>
+      <dgm:t>
+        <a:bodyPr/>
+        <a:lstStyle/>
+        <a:p>
+          <a:endParaRPr lang="de-DE"/>
+        </a:p>
+      </dgm:t>
     </dgm:pt>
   </dgm:ptLst>
   <dgm:cxnLst>
+    <dgm:cxn modelId="{3EFB67F2-B4EB-4EFE-964A-8AF193349332}" type="presOf" srcId="{674503E8-1AC7-41ED-8605-5E819E9C237D}" destId="{B2AC34C9-27F4-4A43-B9E6-31AAF7FDE0CB}" srcOrd="0" destOrd="0" presId="urn:microsoft.com/office/officeart/2005/8/layout/chevron1"/>
     <dgm:cxn modelId="{6D139A0C-1C5F-462F-941A-E83A5038A582}" type="presOf" srcId="{5033FB32-F740-4C19-B504-0647C1F53E48}" destId="{3EB30996-91B3-4239-BF37-88E3C555BC52}" srcOrd="0" destOrd="0" presId="urn:microsoft.com/office/officeart/2005/8/layout/chevron1"/>
     <dgm:cxn modelId="{A9C04542-76A5-484F-BDC6-8684DE3831C0}" srcId="{674503E8-1AC7-41ED-8605-5E819E9C237D}" destId="{5033FB32-F740-4C19-B504-0647C1F53E48}" srcOrd="0" destOrd="0" parTransId="{4F5440BC-E4ED-41F4-BCBC-91A4379FE628}" sibTransId="{0F72E487-3666-4627-B648-0F027167834A}"/>
-    <dgm:cxn modelId="{3EFB67F2-B4EB-4EFE-964A-8AF193349332}" type="presOf" srcId="{674503E8-1AC7-41ED-8605-5E819E9C237D}" destId="{B2AC34C9-27F4-4A43-B9E6-31AAF7FDE0CB}" srcOrd="0" destOrd="0" presId="urn:microsoft.com/office/officeart/2005/8/layout/chevron1"/>
     <dgm:cxn modelId="{E75CA34E-81F5-42E1-938A-72E2F0999817}" type="presParOf" srcId="{B2AC34C9-27F4-4A43-B9E6-31AAF7FDE0CB}" destId="{3EB30996-91B3-4239-BF37-88E3C555BC52}" srcOrd="0" destOrd="0" presId="urn:microsoft.com/office/officeart/2005/8/layout/chevron1"/>
   </dgm:cxnLst>
   <dgm:bg/>
@@ -13248,12 +13297,19 @@
         </dgm:presLayoutVars>
       </dgm:prSet>
       <dgm:spPr/>
+      <dgm:t>
+        <a:bodyPr/>
+        <a:lstStyle/>
+        <a:p>
+          <a:endParaRPr lang="de-DE"/>
+        </a:p>
+      </dgm:t>
     </dgm:pt>
   </dgm:ptLst>
   <dgm:cxnLst>
+    <dgm:cxn modelId="{3EFB67F2-B4EB-4EFE-964A-8AF193349332}" type="presOf" srcId="{674503E8-1AC7-41ED-8605-5E819E9C237D}" destId="{B2AC34C9-27F4-4A43-B9E6-31AAF7FDE0CB}" srcOrd="0" destOrd="0" presId="urn:microsoft.com/office/officeart/2005/8/layout/chevron1"/>
     <dgm:cxn modelId="{6D139A0C-1C5F-462F-941A-E83A5038A582}" type="presOf" srcId="{5033FB32-F740-4C19-B504-0647C1F53E48}" destId="{3EB30996-91B3-4239-BF37-88E3C555BC52}" srcOrd="0" destOrd="0" presId="urn:microsoft.com/office/officeart/2005/8/layout/chevron1"/>
     <dgm:cxn modelId="{A9C04542-76A5-484F-BDC6-8684DE3831C0}" srcId="{674503E8-1AC7-41ED-8605-5E819E9C237D}" destId="{5033FB32-F740-4C19-B504-0647C1F53E48}" srcOrd="0" destOrd="0" parTransId="{4F5440BC-E4ED-41F4-BCBC-91A4379FE628}" sibTransId="{0F72E487-3666-4627-B648-0F027167834A}"/>
-    <dgm:cxn modelId="{3EFB67F2-B4EB-4EFE-964A-8AF193349332}" type="presOf" srcId="{674503E8-1AC7-41ED-8605-5E819E9C237D}" destId="{B2AC34C9-27F4-4A43-B9E6-31AAF7FDE0CB}" srcOrd="0" destOrd="0" presId="urn:microsoft.com/office/officeart/2005/8/layout/chevron1"/>
     <dgm:cxn modelId="{E75CA34E-81F5-42E1-938A-72E2F0999817}" type="presParOf" srcId="{B2AC34C9-27F4-4A43-B9E6-31AAF7FDE0CB}" destId="{3EB30996-91B3-4239-BF37-88E3C555BC52}" srcOrd="0" destOrd="0" presId="urn:microsoft.com/office/officeart/2005/8/layout/chevron1"/>
   </dgm:cxnLst>
   <dgm:bg/>
@@ -13336,12 +13392,19 @@
         </dgm:presLayoutVars>
       </dgm:prSet>
       <dgm:spPr/>
+      <dgm:t>
+        <a:bodyPr/>
+        <a:lstStyle/>
+        <a:p>
+          <a:endParaRPr lang="de-DE"/>
+        </a:p>
+      </dgm:t>
     </dgm:pt>
   </dgm:ptLst>
   <dgm:cxnLst>
+    <dgm:cxn modelId="{3EFB67F2-B4EB-4EFE-964A-8AF193349332}" type="presOf" srcId="{674503E8-1AC7-41ED-8605-5E819E9C237D}" destId="{B2AC34C9-27F4-4A43-B9E6-31AAF7FDE0CB}" srcOrd="0" destOrd="0" presId="urn:microsoft.com/office/officeart/2005/8/layout/chevron1"/>
     <dgm:cxn modelId="{6D139A0C-1C5F-462F-941A-E83A5038A582}" type="presOf" srcId="{5033FB32-F740-4C19-B504-0647C1F53E48}" destId="{3EB30996-91B3-4239-BF37-88E3C555BC52}" srcOrd="0" destOrd="0" presId="urn:microsoft.com/office/officeart/2005/8/layout/chevron1"/>
     <dgm:cxn modelId="{A9C04542-76A5-484F-BDC6-8684DE3831C0}" srcId="{674503E8-1AC7-41ED-8605-5E819E9C237D}" destId="{5033FB32-F740-4C19-B504-0647C1F53E48}" srcOrd="0" destOrd="0" parTransId="{4F5440BC-E4ED-41F4-BCBC-91A4379FE628}" sibTransId="{0F72E487-3666-4627-B648-0F027167834A}"/>
-    <dgm:cxn modelId="{3EFB67F2-B4EB-4EFE-964A-8AF193349332}" type="presOf" srcId="{674503E8-1AC7-41ED-8605-5E819E9C237D}" destId="{B2AC34C9-27F4-4A43-B9E6-31AAF7FDE0CB}" srcOrd="0" destOrd="0" presId="urn:microsoft.com/office/officeart/2005/8/layout/chevron1"/>
     <dgm:cxn modelId="{E75CA34E-81F5-42E1-938A-72E2F0999817}" type="presParOf" srcId="{B2AC34C9-27F4-4A43-B9E6-31AAF7FDE0CB}" destId="{3EB30996-91B3-4239-BF37-88E3C555BC52}" srcOrd="0" destOrd="0" presId="urn:microsoft.com/office/officeart/2005/8/layout/chevron1"/>
   </dgm:cxnLst>
   <dgm:bg/>
@@ -13424,12 +13487,19 @@
         </dgm:presLayoutVars>
       </dgm:prSet>
       <dgm:spPr/>
+      <dgm:t>
+        <a:bodyPr/>
+        <a:lstStyle/>
+        <a:p>
+          <a:endParaRPr lang="de-DE"/>
+        </a:p>
+      </dgm:t>
     </dgm:pt>
   </dgm:ptLst>
   <dgm:cxnLst>
+    <dgm:cxn modelId="{3EFB67F2-B4EB-4EFE-964A-8AF193349332}" type="presOf" srcId="{674503E8-1AC7-41ED-8605-5E819E9C237D}" destId="{B2AC34C9-27F4-4A43-B9E6-31AAF7FDE0CB}" srcOrd="0" destOrd="0" presId="urn:microsoft.com/office/officeart/2005/8/layout/chevron1"/>
     <dgm:cxn modelId="{6D139A0C-1C5F-462F-941A-E83A5038A582}" type="presOf" srcId="{5033FB32-F740-4C19-B504-0647C1F53E48}" destId="{3EB30996-91B3-4239-BF37-88E3C555BC52}" srcOrd="0" destOrd="0" presId="urn:microsoft.com/office/officeart/2005/8/layout/chevron1"/>
     <dgm:cxn modelId="{A9C04542-76A5-484F-BDC6-8684DE3831C0}" srcId="{674503E8-1AC7-41ED-8605-5E819E9C237D}" destId="{5033FB32-F740-4C19-B504-0647C1F53E48}" srcOrd="0" destOrd="0" parTransId="{4F5440BC-E4ED-41F4-BCBC-91A4379FE628}" sibTransId="{0F72E487-3666-4627-B648-0F027167834A}"/>
-    <dgm:cxn modelId="{3EFB67F2-B4EB-4EFE-964A-8AF193349332}" type="presOf" srcId="{674503E8-1AC7-41ED-8605-5E819E9C237D}" destId="{B2AC34C9-27F4-4A43-B9E6-31AAF7FDE0CB}" srcOrd="0" destOrd="0" presId="urn:microsoft.com/office/officeart/2005/8/layout/chevron1"/>
     <dgm:cxn modelId="{E75CA34E-81F5-42E1-938A-72E2F0999817}" type="presParOf" srcId="{B2AC34C9-27F4-4A43-B9E6-31AAF7FDE0CB}" destId="{3EB30996-91B3-4239-BF37-88E3C555BC52}" srcOrd="0" destOrd="0" presId="urn:microsoft.com/office/officeart/2005/8/layout/chevron1"/>
   </dgm:cxnLst>
   <dgm:bg/>
@@ -13512,12 +13582,19 @@
         </dgm:presLayoutVars>
       </dgm:prSet>
       <dgm:spPr/>
+      <dgm:t>
+        <a:bodyPr/>
+        <a:lstStyle/>
+        <a:p>
+          <a:endParaRPr lang="de-DE"/>
+        </a:p>
+      </dgm:t>
     </dgm:pt>
   </dgm:ptLst>
   <dgm:cxnLst>
+    <dgm:cxn modelId="{3EFB67F2-B4EB-4EFE-964A-8AF193349332}" type="presOf" srcId="{674503E8-1AC7-41ED-8605-5E819E9C237D}" destId="{B2AC34C9-27F4-4A43-B9E6-31AAF7FDE0CB}" srcOrd="0" destOrd="0" presId="urn:microsoft.com/office/officeart/2005/8/layout/chevron1"/>
     <dgm:cxn modelId="{6D139A0C-1C5F-462F-941A-E83A5038A582}" type="presOf" srcId="{5033FB32-F740-4C19-B504-0647C1F53E48}" destId="{3EB30996-91B3-4239-BF37-88E3C555BC52}" srcOrd="0" destOrd="0" presId="urn:microsoft.com/office/officeart/2005/8/layout/chevron1"/>
     <dgm:cxn modelId="{A9C04542-76A5-484F-BDC6-8684DE3831C0}" srcId="{674503E8-1AC7-41ED-8605-5E819E9C237D}" destId="{5033FB32-F740-4C19-B504-0647C1F53E48}" srcOrd="0" destOrd="0" parTransId="{4F5440BC-E4ED-41F4-BCBC-91A4379FE628}" sibTransId="{0F72E487-3666-4627-B648-0F027167834A}"/>
-    <dgm:cxn modelId="{3EFB67F2-B4EB-4EFE-964A-8AF193349332}" type="presOf" srcId="{674503E8-1AC7-41ED-8605-5E819E9C237D}" destId="{B2AC34C9-27F4-4A43-B9E6-31AAF7FDE0CB}" srcOrd="0" destOrd="0" presId="urn:microsoft.com/office/officeart/2005/8/layout/chevron1"/>
     <dgm:cxn modelId="{E75CA34E-81F5-42E1-938A-72E2F0999817}" type="presParOf" srcId="{B2AC34C9-27F4-4A43-B9E6-31AAF7FDE0CB}" destId="{3EB30996-91B3-4239-BF37-88E3C555BC52}" srcOrd="0" destOrd="0" presId="urn:microsoft.com/office/officeart/2005/8/layout/chevron1"/>
   </dgm:cxnLst>
   <dgm:bg/>
@@ -13600,12 +13677,19 @@
         </dgm:presLayoutVars>
       </dgm:prSet>
       <dgm:spPr/>
+      <dgm:t>
+        <a:bodyPr/>
+        <a:lstStyle/>
+        <a:p>
+          <a:endParaRPr lang="de-DE"/>
+        </a:p>
+      </dgm:t>
     </dgm:pt>
   </dgm:ptLst>
   <dgm:cxnLst>
+    <dgm:cxn modelId="{3EFB67F2-B4EB-4EFE-964A-8AF193349332}" type="presOf" srcId="{674503E8-1AC7-41ED-8605-5E819E9C237D}" destId="{B2AC34C9-27F4-4A43-B9E6-31AAF7FDE0CB}" srcOrd="0" destOrd="0" presId="urn:microsoft.com/office/officeart/2005/8/layout/chevron1"/>
     <dgm:cxn modelId="{6D139A0C-1C5F-462F-941A-E83A5038A582}" type="presOf" srcId="{5033FB32-F740-4C19-B504-0647C1F53E48}" destId="{3EB30996-91B3-4239-BF37-88E3C555BC52}" srcOrd="0" destOrd="0" presId="urn:microsoft.com/office/officeart/2005/8/layout/chevron1"/>
     <dgm:cxn modelId="{A9C04542-76A5-484F-BDC6-8684DE3831C0}" srcId="{674503E8-1AC7-41ED-8605-5E819E9C237D}" destId="{5033FB32-F740-4C19-B504-0647C1F53E48}" srcOrd="0" destOrd="0" parTransId="{4F5440BC-E4ED-41F4-BCBC-91A4379FE628}" sibTransId="{0F72E487-3666-4627-B648-0F027167834A}"/>
-    <dgm:cxn modelId="{3EFB67F2-B4EB-4EFE-964A-8AF193349332}" type="presOf" srcId="{674503E8-1AC7-41ED-8605-5E819E9C237D}" destId="{B2AC34C9-27F4-4A43-B9E6-31AAF7FDE0CB}" srcOrd="0" destOrd="0" presId="urn:microsoft.com/office/officeart/2005/8/layout/chevron1"/>
     <dgm:cxn modelId="{E75CA34E-81F5-42E1-938A-72E2F0999817}" type="presParOf" srcId="{B2AC34C9-27F4-4A43-B9E6-31AAF7FDE0CB}" destId="{3EB30996-91B3-4239-BF37-88E3C555BC52}" srcOrd="0" destOrd="0" presId="urn:microsoft.com/office/officeart/2005/8/layout/chevron1"/>
   </dgm:cxnLst>
   <dgm:bg/>
@@ -13688,12 +13772,19 @@
         </dgm:presLayoutVars>
       </dgm:prSet>
       <dgm:spPr/>
+      <dgm:t>
+        <a:bodyPr/>
+        <a:lstStyle/>
+        <a:p>
+          <a:endParaRPr lang="de-DE"/>
+        </a:p>
+      </dgm:t>
     </dgm:pt>
   </dgm:ptLst>
   <dgm:cxnLst>
+    <dgm:cxn modelId="{3EFB67F2-B4EB-4EFE-964A-8AF193349332}" type="presOf" srcId="{674503E8-1AC7-41ED-8605-5E819E9C237D}" destId="{B2AC34C9-27F4-4A43-B9E6-31AAF7FDE0CB}" srcOrd="0" destOrd="0" presId="urn:microsoft.com/office/officeart/2005/8/layout/chevron1"/>
     <dgm:cxn modelId="{6D139A0C-1C5F-462F-941A-E83A5038A582}" type="presOf" srcId="{5033FB32-F740-4C19-B504-0647C1F53E48}" destId="{3EB30996-91B3-4239-BF37-88E3C555BC52}" srcOrd="0" destOrd="0" presId="urn:microsoft.com/office/officeart/2005/8/layout/chevron1"/>
     <dgm:cxn modelId="{A9C04542-76A5-484F-BDC6-8684DE3831C0}" srcId="{674503E8-1AC7-41ED-8605-5E819E9C237D}" destId="{5033FB32-F740-4C19-B504-0647C1F53E48}" srcOrd="0" destOrd="0" parTransId="{4F5440BC-E4ED-41F4-BCBC-91A4379FE628}" sibTransId="{0F72E487-3666-4627-B648-0F027167834A}"/>
-    <dgm:cxn modelId="{3EFB67F2-B4EB-4EFE-964A-8AF193349332}" type="presOf" srcId="{674503E8-1AC7-41ED-8605-5E819E9C237D}" destId="{B2AC34C9-27F4-4A43-B9E6-31AAF7FDE0CB}" srcOrd="0" destOrd="0" presId="urn:microsoft.com/office/officeart/2005/8/layout/chevron1"/>
     <dgm:cxn modelId="{E75CA34E-81F5-42E1-938A-72E2F0999817}" type="presParOf" srcId="{B2AC34C9-27F4-4A43-B9E6-31AAF7FDE0CB}" destId="{3EB30996-91B3-4239-BF37-88E3C555BC52}" srcOrd="0" destOrd="0" presId="urn:microsoft.com/office/officeart/2005/8/layout/chevron1"/>
   </dgm:cxnLst>
   <dgm:bg/>
@@ -13776,12 +13867,19 @@
         </dgm:presLayoutVars>
       </dgm:prSet>
       <dgm:spPr/>
+      <dgm:t>
+        <a:bodyPr/>
+        <a:lstStyle/>
+        <a:p>
+          <a:endParaRPr lang="de-DE"/>
+        </a:p>
+      </dgm:t>
     </dgm:pt>
   </dgm:ptLst>
   <dgm:cxnLst>
+    <dgm:cxn modelId="{3EFB67F2-B4EB-4EFE-964A-8AF193349332}" type="presOf" srcId="{674503E8-1AC7-41ED-8605-5E819E9C237D}" destId="{B2AC34C9-27F4-4A43-B9E6-31AAF7FDE0CB}" srcOrd="0" destOrd="0" presId="urn:microsoft.com/office/officeart/2005/8/layout/chevron1"/>
     <dgm:cxn modelId="{6D139A0C-1C5F-462F-941A-E83A5038A582}" type="presOf" srcId="{5033FB32-F740-4C19-B504-0647C1F53E48}" destId="{3EB30996-91B3-4239-BF37-88E3C555BC52}" srcOrd="0" destOrd="0" presId="urn:microsoft.com/office/officeart/2005/8/layout/chevron1"/>
     <dgm:cxn modelId="{A9C04542-76A5-484F-BDC6-8684DE3831C0}" srcId="{674503E8-1AC7-41ED-8605-5E819E9C237D}" destId="{5033FB32-F740-4C19-B504-0647C1F53E48}" srcOrd="0" destOrd="0" parTransId="{4F5440BC-E4ED-41F4-BCBC-91A4379FE628}" sibTransId="{0F72E487-3666-4627-B648-0F027167834A}"/>
-    <dgm:cxn modelId="{3EFB67F2-B4EB-4EFE-964A-8AF193349332}" type="presOf" srcId="{674503E8-1AC7-41ED-8605-5E819E9C237D}" destId="{B2AC34C9-27F4-4A43-B9E6-31AAF7FDE0CB}" srcOrd="0" destOrd="0" presId="urn:microsoft.com/office/officeart/2005/8/layout/chevron1"/>
     <dgm:cxn modelId="{E75CA34E-81F5-42E1-938A-72E2F0999817}" type="presParOf" srcId="{B2AC34C9-27F4-4A43-B9E6-31AAF7FDE0CB}" destId="{3EB30996-91B3-4239-BF37-88E3C555BC52}" srcOrd="0" destOrd="0" presId="urn:microsoft.com/office/officeart/2005/8/layout/chevron1"/>
   </dgm:cxnLst>
   <dgm:bg/>
@@ -13861,7 +13959,7 @@
         </a:bodyPr>
         <a:lstStyle/>
         <a:p>
-          <a:pPr marL="0" lvl="0" indent="0" algn="ctr" defTabSz="844550">
+          <a:pPr lvl="0" algn="ctr" defTabSz="844550">
             <a:lnSpc>
               <a:spcPct val="90000"/>
             </a:lnSpc>
@@ -13871,7 +13969,6 @@
             <a:spcAft>
               <a:spcPct val="35000"/>
             </a:spcAft>
-            <a:buNone/>
           </a:pPr>
           <a:r>
             <a:rPr lang="de-DE" sz="1900" kern="1200" dirty="0">
@@ -13957,7 +14054,7 @@
         </a:bodyPr>
         <a:lstStyle/>
         <a:p>
-          <a:pPr marL="0" lvl="0" indent="0" algn="ctr" defTabSz="844550">
+          <a:pPr lvl="0" algn="ctr" defTabSz="844550">
             <a:lnSpc>
               <a:spcPct val="90000"/>
             </a:lnSpc>
@@ -13967,7 +14064,6 @@
             <a:spcAft>
               <a:spcPct val="35000"/>
             </a:spcAft>
-            <a:buNone/>
           </a:pPr>
           <a:r>
             <a:rPr lang="de-DE" sz="1900" kern="1200" dirty="0">
@@ -14053,7 +14149,7 @@
         </a:bodyPr>
         <a:lstStyle/>
         <a:p>
-          <a:pPr marL="0" lvl="0" indent="0" algn="ctr" defTabSz="844550">
+          <a:pPr lvl="0" algn="ctr" defTabSz="844550">
             <a:lnSpc>
               <a:spcPct val="90000"/>
             </a:lnSpc>
@@ -14063,7 +14159,6 @@
             <a:spcAft>
               <a:spcPct val="35000"/>
             </a:spcAft>
-            <a:buNone/>
           </a:pPr>
           <a:r>
             <a:rPr lang="de-DE" sz="1900" kern="1200" dirty="0">
@@ -14149,7 +14244,7 @@
         </a:bodyPr>
         <a:lstStyle/>
         <a:p>
-          <a:pPr marL="0" lvl="0" indent="0" algn="ctr" defTabSz="844550">
+          <a:pPr lvl="0" algn="ctr" defTabSz="844550">
             <a:lnSpc>
               <a:spcPct val="90000"/>
             </a:lnSpc>
@@ -14159,7 +14254,6 @@
             <a:spcAft>
               <a:spcPct val="35000"/>
             </a:spcAft>
-            <a:buNone/>
           </a:pPr>
           <a:r>
             <a:rPr lang="de-DE" sz="1900" kern="1200" dirty="0">
@@ -14245,7 +14339,7 @@
         </a:bodyPr>
         <a:lstStyle/>
         <a:p>
-          <a:pPr marL="0" lvl="0" indent="0" algn="ctr" defTabSz="844550">
+          <a:pPr lvl="0" algn="ctr" defTabSz="844550">
             <a:lnSpc>
               <a:spcPct val="90000"/>
             </a:lnSpc>
@@ -14255,7 +14349,6 @@
             <a:spcAft>
               <a:spcPct val="35000"/>
             </a:spcAft>
-            <a:buNone/>
           </a:pPr>
           <a:r>
             <a:rPr lang="de-DE" sz="1900" kern="1200" dirty="0">
@@ -14341,7 +14434,7 @@
         </a:bodyPr>
         <a:lstStyle/>
         <a:p>
-          <a:pPr marL="0" lvl="0" indent="0" algn="ctr" defTabSz="844550">
+          <a:pPr lvl="0" algn="ctr" defTabSz="844550">
             <a:lnSpc>
               <a:spcPct val="90000"/>
             </a:lnSpc>
@@ -14351,7 +14444,6 @@
             <a:spcAft>
               <a:spcPct val="35000"/>
             </a:spcAft>
-            <a:buNone/>
           </a:pPr>
           <a:r>
             <a:rPr lang="de-DE" sz="1900" b="0" kern="1200" dirty="0">
@@ -14437,7 +14529,7 @@
         </a:bodyPr>
         <a:lstStyle/>
         <a:p>
-          <a:pPr marL="0" lvl="0" indent="0" algn="ctr" defTabSz="1066800">
+          <a:pPr lvl="0" algn="ctr" defTabSz="1066800">
             <a:lnSpc>
               <a:spcPct val="90000"/>
             </a:lnSpc>
@@ -14447,7 +14539,6 @@
             <a:spcAft>
               <a:spcPct val="35000"/>
             </a:spcAft>
-            <a:buNone/>
           </a:pPr>
           <a:r>
             <a:rPr lang="de-DE" sz="2400" kern="1200" dirty="0">
@@ -14527,7 +14618,7 @@
         </a:bodyPr>
         <a:lstStyle/>
         <a:p>
-          <a:pPr marL="0" lvl="0" indent="0" algn="ctr" defTabSz="844550">
+          <a:pPr lvl="0" algn="ctr" defTabSz="844550">
             <a:lnSpc>
               <a:spcPct val="90000"/>
             </a:lnSpc>
@@ -14537,7 +14628,6 @@
             <a:spcAft>
               <a:spcPct val="35000"/>
             </a:spcAft>
-            <a:buNone/>
           </a:pPr>
           <a:r>
             <a:rPr lang="de-DE" sz="1900" kern="1200" dirty="0">
@@ -14623,7 +14713,7 @@
         </a:bodyPr>
         <a:lstStyle/>
         <a:p>
-          <a:pPr marL="0" lvl="0" indent="0" algn="ctr" defTabSz="844550">
+          <a:pPr lvl="0" algn="ctr" defTabSz="844550">
             <a:lnSpc>
               <a:spcPct val="90000"/>
             </a:lnSpc>
@@ -14633,7 +14723,6 @@
             <a:spcAft>
               <a:spcPct val="35000"/>
             </a:spcAft>
-            <a:buNone/>
           </a:pPr>
           <a:r>
             <a:rPr lang="de-DE" sz="1900" kern="1200" dirty="0">
@@ -14719,7 +14808,7 @@
         </a:bodyPr>
         <a:lstStyle/>
         <a:p>
-          <a:pPr marL="0" lvl="0" indent="0" algn="ctr" defTabSz="844550">
+          <a:pPr lvl="0" algn="ctr" defTabSz="844550">
             <a:lnSpc>
               <a:spcPct val="90000"/>
             </a:lnSpc>
@@ -14729,7 +14818,6 @@
             <a:spcAft>
               <a:spcPct val="35000"/>
             </a:spcAft>
-            <a:buNone/>
           </a:pPr>
           <a:r>
             <a:rPr lang="de-DE" sz="1900" kern="1200" dirty="0">
@@ -14815,7 +14903,7 @@
         </a:bodyPr>
         <a:lstStyle/>
         <a:p>
-          <a:pPr marL="0" lvl="0" indent="0" algn="ctr" defTabSz="844550">
+          <a:pPr lvl="0" algn="ctr" defTabSz="844550">
             <a:lnSpc>
               <a:spcPct val="90000"/>
             </a:lnSpc>
@@ -14825,7 +14913,6 @@
             <a:spcAft>
               <a:spcPct val="35000"/>
             </a:spcAft>
-            <a:buNone/>
           </a:pPr>
           <a:r>
             <a:rPr lang="de-DE" sz="1900" kern="1200" dirty="0">
@@ -14911,7 +14998,7 @@
         </a:bodyPr>
         <a:lstStyle/>
         <a:p>
-          <a:pPr marL="0" lvl="0" indent="0" algn="ctr" defTabSz="844550">
+          <a:pPr lvl="0" algn="ctr" defTabSz="844550">
             <a:lnSpc>
               <a:spcPct val="90000"/>
             </a:lnSpc>
@@ -14921,7 +15008,6 @@
             <a:spcAft>
               <a:spcPct val="35000"/>
             </a:spcAft>
-            <a:buNone/>
           </a:pPr>
           <a:r>
             <a:rPr lang="de-DE" sz="1900" kern="1200" dirty="0">
@@ -15007,7 +15093,7 @@
         </a:bodyPr>
         <a:lstStyle/>
         <a:p>
-          <a:pPr marL="0" lvl="0" indent="0" algn="ctr" defTabSz="844550">
+          <a:pPr lvl="0" algn="ctr" defTabSz="844550">
             <a:lnSpc>
               <a:spcPct val="90000"/>
             </a:lnSpc>
@@ -15017,7 +15103,6 @@
             <a:spcAft>
               <a:spcPct val="35000"/>
             </a:spcAft>
-            <a:buNone/>
           </a:pPr>
           <a:r>
             <a:rPr lang="de-DE" sz="1900" kern="1200" dirty="0">
@@ -15103,7 +15188,7 @@
         </a:bodyPr>
         <a:lstStyle/>
         <a:p>
-          <a:pPr marL="0" lvl="0" indent="0" algn="ctr" defTabSz="844550">
+          <a:pPr lvl="0" algn="ctr" defTabSz="844550">
             <a:lnSpc>
               <a:spcPct val="90000"/>
             </a:lnSpc>
@@ -15113,7 +15198,6 @@
             <a:spcAft>
               <a:spcPct val="35000"/>
             </a:spcAft>
-            <a:buNone/>
           </a:pPr>
           <a:r>
             <a:rPr lang="de-DE" sz="1900" kern="1200" dirty="0">
@@ -34071,9 +34155,12 @@
               <a:defRPr/>
             </a:pPr>
             <a:r>
-              <a:rPr lang="de-DE" dirty="0"/>
-              <a:t>Zuständig Hüseyin</a:t>
+              <a:rPr lang="de-DE" dirty="0" smtClean="0"/>
+              <a:t>Zuständig Adrian</a:t>
             </a:r>
+          </a:p>
+          <a:p>
+            <a:endParaRPr lang="de-DE" dirty="0"/>
           </a:p>
         </p:txBody>
       </p:sp>
@@ -34103,7 +34190,7 @@
     </p:spTree>
     <p:extLst>
       <p:ext uri="{BB962C8B-B14F-4D97-AF65-F5344CB8AC3E}">
-        <p14:creationId xmlns:p14="http://schemas.microsoft.com/office/powerpoint/2010/main" val="111653762"/>
+        <p14:creationId xmlns:p14="http://schemas.microsoft.com/office/powerpoint/2010/main" val="58523554"/>
       </p:ext>
     </p:extLst>
   </p:cSld>
@@ -34470,9 +34557,12 @@
               <a:defRPr/>
             </a:pPr>
             <a:r>
-              <a:rPr lang="de-DE" dirty="0"/>
-              <a:t>Zuständig Angelo</a:t>
+              <a:rPr lang="de-DE" dirty="0" smtClean="0"/>
+              <a:t>Zuständig Adrian</a:t>
             </a:r>
+          </a:p>
+          <a:p>
+            <a:endParaRPr lang="de-DE" dirty="0"/>
           </a:p>
         </p:txBody>
       </p:sp>
@@ -34502,7 +34592,7 @@
     </p:spTree>
     <p:extLst>
       <p:ext uri="{BB962C8B-B14F-4D97-AF65-F5344CB8AC3E}">
-        <p14:creationId xmlns:p14="http://schemas.microsoft.com/office/powerpoint/2010/main" val="2338201594"/>
+        <p14:creationId xmlns:p14="http://schemas.microsoft.com/office/powerpoint/2010/main" val="2817754808"/>
       </p:ext>
     </p:extLst>
   </p:cSld>
@@ -34904,9 +34994,12 @@
               <a:defRPr/>
             </a:pPr>
             <a:r>
-              <a:rPr lang="de-DE" dirty="0"/>
-              <a:t>Zuständig Eduard</a:t>
+              <a:rPr lang="de-DE" dirty="0" smtClean="0"/>
+              <a:t>Zuständig Adrian</a:t>
             </a:r>
+          </a:p>
+          <a:p>
+            <a:endParaRPr lang="de-DE" dirty="0"/>
           </a:p>
         </p:txBody>
       </p:sp>
@@ -34936,7 +35029,7 @@
     </p:spTree>
     <p:extLst>
       <p:ext uri="{BB962C8B-B14F-4D97-AF65-F5344CB8AC3E}">
-        <p14:creationId xmlns:p14="http://schemas.microsoft.com/office/powerpoint/2010/main" val="1510781983"/>
+        <p14:creationId xmlns:p14="http://schemas.microsoft.com/office/powerpoint/2010/main" val="1949162645"/>
       </p:ext>
     </p:extLst>
   </p:cSld>
@@ -35460,9 +35553,12 @@
               <a:defRPr/>
             </a:pPr>
             <a:r>
-              <a:rPr lang="de-DE" dirty="0"/>
+              <a:rPr lang="de-DE" dirty="0" smtClean="0"/>
               <a:t>Zuständig Adrian</a:t>
             </a:r>
+          </a:p>
+          <a:p>
+            <a:endParaRPr lang="de-DE" dirty="0"/>
           </a:p>
         </p:txBody>
       </p:sp>
@@ -35492,7 +35588,7 @@
     </p:spTree>
     <p:extLst>
       <p:ext uri="{BB962C8B-B14F-4D97-AF65-F5344CB8AC3E}">
-        <p14:creationId xmlns:p14="http://schemas.microsoft.com/office/powerpoint/2010/main" val="734047197"/>
+        <p14:creationId xmlns:p14="http://schemas.microsoft.com/office/powerpoint/2010/main" val="1689871872"/>
       </p:ext>
     </p:extLst>
   </p:cSld>
@@ -35651,9 +35747,12 @@
               <a:defRPr/>
             </a:pPr>
             <a:r>
-              <a:rPr lang="de-DE" dirty="0"/>
+              <a:rPr lang="de-DE" dirty="0" smtClean="0"/>
               <a:t>Zuständig Adrian</a:t>
             </a:r>
+          </a:p>
+          <a:p>
+            <a:endParaRPr lang="de-DE" dirty="0"/>
           </a:p>
         </p:txBody>
       </p:sp>
@@ -35683,7 +35782,7 @@
     </p:spTree>
     <p:extLst>
       <p:ext uri="{BB962C8B-B14F-4D97-AF65-F5344CB8AC3E}">
-        <p14:creationId xmlns:p14="http://schemas.microsoft.com/office/powerpoint/2010/main" val="3213615048"/>
+        <p14:creationId xmlns:p14="http://schemas.microsoft.com/office/powerpoint/2010/main" val="427167569"/>
       </p:ext>
     </p:extLst>
   </p:cSld>
@@ -39701,7 +39800,7 @@
         </p:blipFill>
         <p:spPr>
           <a:xfrm>
-            <a:off x="5106848" y="1951274"/>
+            <a:off x="5183048" y="3048554"/>
             <a:ext cx="1392702" cy="401920"/>
           </a:xfrm>
           <a:prstGeom prst="rect">
@@ -39723,7 +39822,7 @@
         </p:nvSpPr>
         <p:spPr>
           <a:xfrm>
-            <a:off x="2369786" y="2353194"/>
+            <a:off x="2445986" y="3450474"/>
             <a:ext cx="6866826" cy="754694"/>
           </a:xfrm>
           <a:prstGeom prst="rect">
@@ -39736,13 +39835,13 @@
           </a:bodyPr>
           <a:lstStyle/>
           <a:p>
-            <a:pPr lvl="1" algn="ctr">
+            <a:pPr algn="ctr">
               <a:lnSpc>
                 <a:spcPct val="150000"/>
               </a:lnSpc>
             </a:pPr>
             <a:r>
-              <a:rPr lang="de-DE" sz="3200" b="1" dirty="0">
+              <a:rPr lang="de-DE" sz="3200" b="1" dirty="0" smtClean="0">
                 <a:solidFill>
                   <a:srgbClr val="385723"/>
                 </a:solidFill>
@@ -39750,6 +39849,12 @@
               </a:rPr>
               <a:t>Schwerpunkte der Implementierung</a:t>
             </a:r>
+            <a:endParaRPr lang="de-DE" sz="3200" b="1" dirty="0">
+              <a:solidFill>
+                <a:srgbClr val="385723"/>
+              </a:solidFill>
+              <a:latin typeface="Corbel Light" panose="020B0303020204020204" pitchFamily="34" charset="0"/>
+            </a:endParaRPr>
           </a:p>
         </p:txBody>
       </p:sp>
@@ -39758,7 +39863,7 @@
           <p:cNvPr id="4" name="Rechteck 3">
             <a:extLst>
               <a:ext uri="{FF2B5EF4-FFF2-40B4-BE49-F238E27FC236}">
-                <a16:creationId xmlns:a16="http://schemas.microsoft.com/office/drawing/2014/main" id="{F227C5F2-286D-43A6-9C94-FEB50B0FC50C}"/>
+                <a16:creationId xmlns:a16="http://schemas.microsoft.com/office/drawing/2014/main" id="{EFECEC75-4288-4464-8926-6B01DB1D4558}"/>
               </a:ext>
             </a:extLst>
           </p:cNvPr>
@@ -39767,8 +39872,8 @@
         </p:nvSpPr>
         <p:spPr>
           <a:xfrm>
-            <a:off x="3066137" y="3534227"/>
-            <a:ext cx="6866826" cy="754694"/>
+            <a:off x="2445986" y="4205168"/>
+            <a:ext cx="6866826" cy="584775"/>
           </a:xfrm>
           <a:prstGeom prst="rect">
             <a:avLst/>
@@ -39780,19 +39885,33 @@
           </a:bodyPr>
           <a:lstStyle/>
           <a:p>
-            <a:pPr lvl="1">
-              <a:lnSpc>
-                <a:spcPct val="150000"/>
-              </a:lnSpc>
-            </a:pPr>
+            <a:pPr algn="ctr"/>
             <a:r>
-              <a:rPr lang="de-DE" sz="3200" b="1" dirty="0">
+              <a:rPr lang="de-DE" sz="3200" dirty="0" smtClean="0">
                 <a:solidFill>
                   <a:srgbClr val="385723"/>
                 </a:solidFill>
                 <a:latin typeface="Corbel Light" panose="020B0303020204020204" pitchFamily="34" charset="0"/>
               </a:rPr>
-              <a:t>JAVA Graphical User Interface</a:t>
+              <a:t>Java </a:t>
+            </a:r>
+            <a:r>
+              <a:rPr lang="de-DE" sz="3200" dirty="0" err="1" smtClean="0">
+                <a:solidFill>
+                  <a:srgbClr val="385723"/>
+                </a:solidFill>
+                <a:latin typeface="Corbel Light" panose="020B0303020204020204" pitchFamily="34" charset="0"/>
+              </a:rPr>
+              <a:t>Graphical</a:t>
+            </a:r>
+            <a:r>
+              <a:rPr lang="de-DE" sz="3200" dirty="0" smtClean="0">
+                <a:solidFill>
+                  <a:srgbClr val="385723"/>
+                </a:solidFill>
+                <a:latin typeface="Corbel Light" panose="020B0303020204020204" pitchFamily="34" charset="0"/>
+              </a:rPr>
+              <a:t> User Interface</a:t>
             </a:r>
           </a:p>
         </p:txBody>
@@ -39800,7 +39919,7 @@
     </p:spTree>
     <p:extLst>
       <p:ext uri="{BB962C8B-B14F-4D97-AF65-F5344CB8AC3E}">
-        <p14:creationId xmlns:p14="http://schemas.microsoft.com/office/powerpoint/2010/main" val="3265211517"/>
+        <p14:creationId xmlns:p14="http://schemas.microsoft.com/office/powerpoint/2010/main" val="2340230325"/>
       </p:ext>
     </p:extLst>
   </p:cSld>
@@ -39819,6 +39938,13 @@
       </p:transition>
     </mc:Fallback>
   </mc:AlternateContent>
+  <p:timing>
+    <p:tnLst>
+      <p:par>
+        <p:cTn id="1" dur="indefinite" restart="never" nodeType="tmRoot"/>
+      </p:par>
+    </p:tnLst>
+  </p:timing>
 </p:sld>
 </file>
 
@@ -39992,6 +40118,13 @@
       </p:transition>
     </mc:Fallback>
   </mc:AlternateContent>
+  <p:timing>
+    <p:tnLst>
+      <p:par>
+        <p:cTn id="1" dur="indefinite" restart="never" nodeType="tmRoot"/>
+      </p:par>
+    </p:tnLst>
+  </p:timing>
 </p:sld>
 </file>
 
@@ -40165,6 +40298,13 @@
       </p:transition>
     </mc:Fallback>
   </mc:AlternateContent>
+  <p:timing>
+    <p:tnLst>
+      <p:par>
+        <p:cTn id="1" dur="indefinite" restart="never" nodeType="tmRoot"/>
+      </p:par>
+    </p:tnLst>
+  </p:timing>
 </p:sld>
 </file>
 
@@ -40379,7 +40519,7 @@
         </p:blipFill>
         <p:spPr>
           <a:xfrm>
-            <a:off x="5106848" y="1951274"/>
+            <a:off x="5183048" y="3048554"/>
             <a:ext cx="1392702" cy="401920"/>
           </a:xfrm>
           <a:prstGeom prst="rect">
@@ -40401,7 +40541,7 @@
         </p:nvSpPr>
         <p:spPr>
           <a:xfrm>
-            <a:off x="2369786" y="2353194"/>
+            <a:off x="2445986" y="3450474"/>
             <a:ext cx="6866826" cy="754694"/>
           </a:xfrm>
           <a:prstGeom prst="rect">
@@ -40414,13 +40554,13 @@
           </a:bodyPr>
           <a:lstStyle/>
           <a:p>
-            <a:pPr lvl="1" algn="ctr">
+            <a:pPr algn="ctr">
               <a:lnSpc>
                 <a:spcPct val="150000"/>
               </a:lnSpc>
             </a:pPr>
             <a:r>
-              <a:rPr lang="de-DE" sz="3200" b="1" dirty="0">
+              <a:rPr lang="de-DE" sz="3200" b="1" dirty="0" smtClean="0">
                 <a:solidFill>
                   <a:srgbClr val="385723"/>
                 </a:solidFill>
@@ -40428,6 +40568,12 @@
               </a:rPr>
               <a:t>Schwerpunkte der Implementierung</a:t>
             </a:r>
+            <a:endParaRPr lang="de-DE" sz="3200" b="1" dirty="0">
+              <a:solidFill>
+                <a:srgbClr val="385723"/>
+              </a:solidFill>
+              <a:latin typeface="Corbel Light" panose="020B0303020204020204" pitchFamily="34" charset="0"/>
+            </a:endParaRPr>
           </a:p>
         </p:txBody>
       </p:sp>
@@ -40436,7 +40582,7 @@
           <p:cNvPr id="4" name="Rechteck 3">
             <a:extLst>
               <a:ext uri="{FF2B5EF4-FFF2-40B4-BE49-F238E27FC236}">
-                <a16:creationId xmlns:a16="http://schemas.microsoft.com/office/drawing/2014/main" id="{F227C5F2-286D-43A6-9C94-FEB50B0FC50C}"/>
+                <a16:creationId xmlns:a16="http://schemas.microsoft.com/office/drawing/2014/main" id="{EFECEC75-4288-4464-8926-6B01DB1D4558}"/>
               </a:ext>
             </a:extLst>
           </p:cNvPr>
@@ -40445,8 +40591,8 @@
         </p:nvSpPr>
         <p:spPr>
           <a:xfrm>
-            <a:off x="3066137" y="3509808"/>
-            <a:ext cx="6866826" cy="754694"/>
+            <a:off x="2445986" y="4205168"/>
+            <a:ext cx="6866826" cy="584775"/>
           </a:xfrm>
           <a:prstGeom prst="rect">
             <a:avLst/>
@@ -40458,13 +40604,9 @@
           </a:bodyPr>
           <a:lstStyle/>
           <a:p>
-            <a:pPr lvl="1">
-              <a:lnSpc>
-                <a:spcPct val="150000"/>
-              </a:lnSpc>
-            </a:pPr>
+            <a:pPr algn="ctr"/>
             <a:r>
-              <a:rPr lang="de-DE" sz="3200" b="1" dirty="0">
+              <a:rPr lang="de-DE" sz="3200" dirty="0" smtClean="0">
                 <a:solidFill>
                   <a:srgbClr val="385723"/>
                 </a:solidFill>
@@ -40472,13 +40614,19 @@
               </a:rPr>
               <a:t>Schnittstellenprogrammierung</a:t>
             </a:r>
+            <a:endParaRPr lang="de-DE" sz="3200" dirty="0">
+              <a:solidFill>
+                <a:srgbClr val="385723"/>
+              </a:solidFill>
+              <a:latin typeface="Corbel Light" panose="020B0303020204020204" pitchFamily="34" charset="0"/>
+            </a:endParaRPr>
           </a:p>
         </p:txBody>
       </p:sp>
     </p:spTree>
     <p:extLst>
       <p:ext uri="{BB962C8B-B14F-4D97-AF65-F5344CB8AC3E}">
-        <p14:creationId xmlns:p14="http://schemas.microsoft.com/office/powerpoint/2010/main" val="90013826"/>
+        <p14:creationId xmlns:p14="http://schemas.microsoft.com/office/powerpoint/2010/main" val="426639519"/>
       </p:ext>
     </p:extLst>
   </p:cSld>
@@ -40497,6 +40645,13 @@
       </p:transition>
     </mc:Fallback>
   </mc:AlternateContent>
+  <p:timing>
+    <p:tnLst>
+      <p:par>
+        <p:cTn id="1" dur="indefinite" restart="never" nodeType="tmRoot"/>
+      </p:par>
+    </p:tnLst>
+  </p:timing>
 </p:sld>
 </file>
 
@@ -41023,6 +41178,18 @@
               </a:rPr>
               <a:t>.</a:t>
             </a:r>
+            <a:r>
+              <a:rPr lang="de-DE" sz="1000" dirty="0">
+                <a:solidFill>
+                  <a:srgbClr val="000000"/>
+                </a:solidFill>
+                <a:effectLst/>
+                <a:latin typeface="Courier New" panose="02070309020205020404" pitchFamily="49" charset="0"/>
+                <a:ea typeface="Calibri" panose="020F0502020204030204" pitchFamily="34" charset="0"/>
+                <a:cs typeface="Times New Roman" panose="02020603050405020304" pitchFamily="18" charset="0"/>
+              </a:rPr>
+              <a:t/>
+            </a:r>
             <a:br>
               <a:rPr lang="de-DE" sz="1000" dirty="0">
                 <a:solidFill>
@@ -41034,6 +41201,18 @@
                 <a:cs typeface="Times New Roman" panose="02020603050405020304" pitchFamily="18" charset="0"/>
               </a:rPr>
             </a:br>
+            <a:r>
+              <a:rPr lang="de-DE" sz="1000" dirty="0">
+                <a:solidFill>
+                  <a:srgbClr val="000000"/>
+                </a:solidFill>
+                <a:effectLst/>
+                <a:latin typeface="Courier New" panose="02070309020205020404" pitchFamily="49" charset="0"/>
+                <a:ea typeface="Calibri" panose="020F0502020204030204" pitchFamily="34" charset="0"/>
+                <a:cs typeface="Times New Roman" panose="02020603050405020304" pitchFamily="18" charset="0"/>
+              </a:rPr>
+              <a:t/>
+            </a:r>
             <a:br>
               <a:rPr lang="de-DE" sz="1000" dirty="0">
                 <a:solidFill>
@@ -41116,6 +41295,18 @@
                 <a:cs typeface="Courier New" panose="02070309020205020404" pitchFamily="49" charset="0"/>
               </a:rPr>
               <a:t>.</a:t>
+            </a:r>
+            <a:r>
+              <a:rPr lang="de-DE" sz="1000" dirty="0">
+                <a:solidFill>
+                  <a:srgbClr val="000000"/>
+                </a:solidFill>
+                <a:effectLst/>
+                <a:latin typeface="Courier New" panose="02070309020205020404" pitchFamily="49" charset="0"/>
+                <a:ea typeface="Calibri" panose="020F0502020204030204" pitchFamily="34" charset="0"/>
+                <a:cs typeface="Times New Roman" panose="02020603050405020304" pitchFamily="18" charset="0"/>
+              </a:rPr>
+              <a:t/>
             </a:r>
             <a:br>
               <a:rPr lang="de-DE" sz="1000" dirty="0">
@@ -41223,6 +41414,18 @@
                 <a:cs typeface="Courier New" panose="02070309020205020404" pitchFamily="49" charset="0"/>
               </a:rPr>
               <a:t>.</a:t>
+            </a:r>
+            <a:r>
+              <a:rPr lang="de-DE" sz="1000" dirty="0">
+                <a:solidFill>
+                  <a:srgbClr val="000000"/>
+                </a:solidFill>
+                <a:effectLst/>
+                <a:latin typeface="Courier New" panose="02070309020205020404" pitchFamily="49" charset="0"/>
+                <a:ea typeface="Calibri" panose="020F0502020204030204" pitchFamily="34" charset="0"/>
+                <a:cs typeface="Times New Roman" panose="02020603050405020304" pitchFamily="18" charset="0"/>
+              </a:rPr>
+              <a:t/>
             </a:r>
             <a:br>
               <a:rPr lang="de-DE" sz="1000" dirty="0">
@@ -41521,6 +41724,18 @@
               </a:rPr>
               <a:t>.</a:t>
             </a:r>
+            <a:r>
+              <a:rPr lang="de-DE" sz="1000" dirty="0">
+                <a:solidFill>
+                  <a:srgbClr val="000000"/>
+                </a:solidFill>
+                <a:effectLst/>
+                <a:latin typeface="Courier New" panose="02070309020205020404" pitchFamily="49" charset="0"/>
+                <a:ea typeface="Calibri" panose="020F0502020204030204" pitchFamily="34" charset="0"/>
+                <a:cs typeface="Times New Roman" panose="02020603050405020304" pitchFamily="18" charset="0"/>
+              </a:rPr>
+              <a:t/>
+            </a:r>
             <a:br>
               <a:rPr lang="de-DE" sz="1000" dirty="0">
                 <a:solidFill>
@@ -41532,6 +41747,18 @@
                 <a:cs typeface="Times New Roman" panose="02020603050405020304" pitchFamily="18" charset="0"/>
               </a:rPr>
             </a:br>
+            <a:r>
+              <a:rPr lang="de-DE" sz="1000" dirty="0">
+                <a:solidFill>
+                  <a:srgbClr val="000000"/>
+                </a:solidFill>
+                <a:effectLst/>
+                <a:latin typeface="Courier New" panose="02070309020205020404" pitchFamily="49" charset="0"/>
+                <a:ea typeface="Calibri" panose="020F0502020204030204" pitchFamily="34" charset="0"/>
+                <a:cs typeface="Times New Roman" panose="02020603050405020304" pitchFamily="18" charset="0"/>
+              </a:rPr>
+              <a:t/>
+            </a:r>
             <a:br>
               <a:rPr lang="de-DE" sz="1000" dirty="0">
                 <a:solidFill>
@@ -43790,7 +44017,7 @@
         </p:blipFill>
         <p:spPr>
           <a:xfrm>
-            <a:off x="5106848" y="1951274"/>
+            <a:off x="5183048" y="3048554"/>
             <a:ext cx="1392702" cy="401920"/>
           </a:xfrm>
           <a:prstGeom prst="rect">
@@ -43812,7 +44039,7 @@
         </p:nvSpPr>
         <p:spPr>
           <a:xfrm>
-            <a:off x="2369786" y="2353194"/>
+            <a:off x="2445986" y="3450474"/>
             <a:ext cx="6866826" cy="754694"/>
           </a:xfrm>
           <a:prstGeom prst="rect">
@@ -43825,27 +44052,51 @@
           </a:bodyPr>
           <a:lstStyle/>
           <a:p>
-            <a:pPr lvl="1" algn="ctr">
+            <a:pPr algn="ctr">
               <a:lnSpc>
                 <a:spcPct val="150000"/>
               </a:lnSpc>
             </a:pPr>
             <a:r>
-              <a:rPr lang="de-DE" sz="3200" b="1" dirty="0">
+              <a:rPr lang="de-DE" sz="3200" b="1" dirty="0" smtClean="0">
                 <a:solidFill>
                   <a:srgbClr val="385723"/>
                 </a:solidFill>
                 <a:latin typeface="Corbel Light" panose="020B0303020204020204" pitchFamily="34" charset="0"/>
               </a:rPr>
-              <a:t>Exkursion Groz-Beckert KG</a:t>
+              <a:t>Exkursion bei </a:t>
             </a:r>
+            <a:r>
+              <a:rPr lang="de-DE" sz="3200" b="1" dirty="0" err="1" smtClean="0">
+                <a:solidFill>
+                  <a:srgbClr val="385723"/>
+                </a:solidFill>
+                <a:latin typeface="Corbel Light" panose="020B0303020204020204" pitchFamily="34" charset="0"/>
+              </a:rPr>
+              <a:t>Groz-Beckert</a:t>
+            </a:r>
+            <a:r>
+              <a:rPr lang="de-DE" sz="3200" b="1" dirty="0" smtClean="0">
+                <a:solidFill>
+                  <a:srgbClr val="385723"/>
+                </a:solidFill>
+                <a:latin typeface="Corbel Light" panose="020B0303020204020204" pitchFamily="34" charset="0"/>
+              </a:rPr>
+              <a:t> KG</a:t>
+            </a:r>
+            <a:endParaRPr lang="de-DE" sz="3200" b="1" dirty="0">
+              <a:solidFill>
+                <a:srgbClr val="385723"/>
+              </a:solidFill>
+              <a:latin typeface="Corbel Light" panose="020B0303020204020204" pitchFamily="34" charset="0"/>
+            </a:endParaRPr>
           </a:p>
         </p:txBody>
       </p:sp>
     </p:spTree>
     <p:extLst>
       <p:ext uri="{BB962C8B-B14F-4D97-AF65-F5344CB8AC3E}">
-        <p14:creationId xmlns:p14="http://schemas.microsoft.com/office/powerpoint/2010/main" val="3327580839"/>
+        <p14:creationId xmlns:p14="http://schemas.microsoft.com/office/powerpoint/2010/main" val="3419683054"/>
       </p:ext>
     </p:extLst>
   </p:cSld>
@@ -43864,6 +44115,13 @@
       </p:transition>
     </mc:Fallback>
   </mc:AlternateContent>
+  <p:timing>
+    <p:tnLst>
+      <p:par>
+        <p:cTn id="1" dur="indefinite" restart="never" nodeType="tmRoot"/>
+      </p:par>
+    </p:tnLst>
+  </p:timing>
 </p:sld>
 </file>
 
@@ -45596,7 +45854,7 @@
         </p:blipFill>
         <p:spPr>
           <a:xfrm>
-            <a:off x="5106848" y="1951274"/>
+            <a:off x="5183048" y="3048554"/>
             <a:ext cx="1392702" cy="401920"/>
           </a:xfrm>
           <a:prstGeom prst="rect">
@@ -45618,8 +45876,8 @@
         </p:nvSpPr>
         <p:spPr>
           <a:xfrm>
-            <a:off x="2021610" y="2328948"/>
-            <a:ext cx="7563177" cy="754694"/>
+            <a:off x="2445986" y="3450474"/>
+            <a:ext cx="6866826" cy="754694"/>
           </a:xfrm>
           <a:prstGeom prst="rect">
             <a:avLst/>
@@ -45631,13 +45889,13 @@
           </a:bodyPr>
           <a:lstStyle/>
           <a:p>
-            <a:pPr lvl="1" algn="ctr">
+            <a:pPr algn="ctr">
               <a:lnSpc>
                 <a:spcPct val="150000"/>
               </a:lnSpc>
             </a:pPr>
             <a:r>
-              <a:rPr lang="de-DE" sz="3200" b="1" dirty="0">
+              <a:rPr lang="de-DE" sz="3200" b="1" dirty="0" smtClean="0">
                 <a:solidFill>
                   <a:srgbClr val="385723"/>
                 </a:solidFill>
@@ -45645,13 +45903,19 @@
               </a:rPr>
               <a:t>Teilprozess der Wareneinlagerung im SAP</a:t>
             </a:r>
+            <a:endParaRPr lang="de-DE" sz="3200" b="1" dirty="0">
+              <a:solidFill>
+                <a:srgbClr val="385723"/>
+              </a:solidFill>
+              <a:latin typeface="Corbel Light" panose="020B0303020204020204" pitchFamily="34" charset="0"/>
+            </a:endParaRPr>
           </a:p>
         </p:txBody>
       </p:sp>
     </p:spTree>
     <p:extLst>
       <p:ext uri="{BB962C8B-B14F-4D97-AF65-F5344CB8AC3E}">
-        <p14:creationId xmlns:p14="http://schemas.microsoft.com/office/powerpoint/2010/main" val="4082556492"/>
+        <p14:creationId xmlns:p14="http://schemas.microsoft.com/office/powerpoint/2010/main" val="2812246189"/>
       </p:ext>
     </p:extLst>
   </p:cSld>
@@ -45670,6 +45934,13 @@
       </p:transition>
     </mc:Fallback>
   </mc:AlternateContent>
+  <p:timing>
+    <p:tnLst>
+      <p:par>
+        <p:cTn id="1" dur="indefinite" restart="never" nodeType="tmRoot"/>
+      </p:par>
+    </p:tnLst>
+  </p:timing>
 </p:sld>
 </file>
 
@@ -47134,7 +47405,7 @@
         </p:blipFill>
         <p:spPr>
           <a:xfrm>
-            <a:off x="5106848" y="1951274"/>
+            <a:off x="5183048" y="3048554"/>
             <a:ext cx="1392702" cy="401920"/>
           </a:xfrm>
           <a:prstGeom prst="rect">
@@ -47156,7 +47427,7 @@
         </p:nvSpPr>
         <p:spPr>
           <a:xfrm>
-            <a:off x="2369786" y="2353194"/>
+            <a:off x="2445986" y="3450474"/>
             <a:ext cx="6866826" cy="754694"/>
           </a:xfrm>
           <a:prstGeom prst="rect">
@@ -47169,13 +47440,13 @@
           </a:bodyPr>
           <a:lstStyle/>
           <a:p>
-            <a:pPr lvl="1" algn="ctr">
+            <a:pPr algn="ctr">
               <a:lnSpc>
                 <a:spcPct val="150000"/>
               </a:lnSpc>
             </a:pPr>
             <a:r>
-              <a:rPr lang="de-DE" sz="3200" b="1" dirty="0">
+              <a:rPr lang="de-DE" sz="3200" b="1" dirty="0" smtClean="0">
                 <a:solidFill>
                   <a:srgbClr val="385723"/>
                 </a:solidFill>
@@ -47183,6 +47454,12 @@
               </a:rPr>
               <a:t>Schwerpunkte der Implementierung</a:t>
             </a:r>
+            <a:endParaRPr lang="de-DE" sz="3200" b="1" dirty="0">
+              <a:solidFill>
+                <a:srgbClr val="385723"/>
+              </a:solidFill>
+              <a:latin typeface="Corbel Light" panose="020B0303020204020204" pitchFamily="34" charset="0"/>
+            </a:endParaRPr>
           </a:p>
         </p:txBody>
       </p:sp>
@@ -47191,7 +47468,7 @@
           <p:cNvPr id="4" name="Rechteck 3">
             <a:extLst>
               <a:ext uri="{FF2B5EF4-FFF2-40B4-BE49-F238E27FC236}">
-                <a16:creationId xmlns:a16="http://schemas.microsoft.com/office/drawing/2014/main" id="{F227C5F2-286D-43A6-9C94-FEB50B0FC50C}"/>
+                <a16:creationId xmlns:a16="http://schemas.microsoft.com/office/drawing/2014/main" id="{EFECEC75-4288-4464-8926-6B01DB1D4558}"/>
               </a:ext>
             </a:extLst>
           </p:cNvPr>
@@ -47200,8 +47477,8 @@
         </p:nvSpPr>
         <p:spPr>
           <a:xfrm>
-            <a:off x="4140947" y="3372766"/>
-            <a:ext cx="3324503" cy="754694"/>
+            <a:off x="2445986" y="4205168"/>
+            <a:ext cx="6866826" cy="584775"/>
           </a:xfrm>
           <a:prstGeom prst="rect">
             <a:avLst/>
@@ -47213,13 +47490,9 @@
           </a:bodyPr>
           <a:lstStyle/>
           <a:p>
-            <a:pPr lvl="1">
-              <a:lnSpc>
-                <a:spcPct val="150000"/>
-              </a:lnSpc>
-            </a:pPr>
+            <a:pPr algn="ctr"/>
             <a:r>
-              <a:rPr lang="de-DE" sz="3200" b="1" dirty="0">
+              <a:rPr lang="de-DE" sz="3200" dirty="0" smtClean="0">
                 <a:solidFill>
                   <a:srgbClr val="385723"/>
                 </a:solidFill>
@@ -47227,13 +47500,19 @@
               </a:rPr>
               <a:t>Speech-2-Text</a:t>
             </a:r>
+            <a:endParaRPr lang="de-DE" sz="3200" dirty="0">
+              <a:solidFill>
+                <a:srgbClr val="385723"/>
+              </a:solidFill>
+              <a:latin typeface="Corbel Light" panose="020B0303020204020204" pitchFamily="34" charset="0"/>
+            </a:endParaRPr>
           </a:p>
         </p:txBody>
       </p:sp>
     </p:spTree>
     <p:extLst>
       <p:ext uri="{BB962C8B-B14F-4D97-AF65-F5344CB8AC3E}">
-        <p14:creationId xmlns:p14="http://schemas.microsoft.com/office/powerpoint/2010/main" val="2003542911"/>
+        <p14:creationId xmlns:p14="http://schemas.microsoft.com/office/powerpoint/2010/main" val="3354551990"/>
       </p:ext>
     </p:extLst>
   </p:cSld>
@@ -47252,6 +47531,13 @@
       </p:transition>
     </mc:Fallback>
   </mc:AlternateContent>
+  <p:timing>
+    <p:tnLst>
+      <p:par>
+        <p:cTn id="1" dur="indefinite" restart="never" nodeType="tmRoot"/>
+      </p:par>
+    </p:tnLst>
+  </p:timing>
 </p:sld>
 </file>
 
@@ -47746,7 +48032,7 @@
                 <a14:useLocalDpi xmlns:a14="http://schemas.microsoft.com/office/drawing/2010/main" val="0"/>
               </a:ext>
               <a:ext uri="{96DAC541-7B7A-43D3-8B79-37D633B846F1}">
-                <asvg:svgBlip xmlns:asvg="http://schemas.microsoft.com/office/drawing/2016/SVG/main" r:embed="rId10"/>
+                <asvg:svgBlip xmlns:asvg="http://schemas.microsoft.com/office/drawing/2016/SVG/main" xmlns="" r:embed="rId10"/>
               </a:ext>
             </a:extLst>
           </a:blip>
@@ -47785,7 +48071,7 @@
                 <a14:useLocalDpi xmlns:a14="http://schemas.microsoft.com/office/drawing/2010/main" val="0"/>
               </a:ext>
               <a:ext uri="{96DAC541-7B7A-43D3-8B79-37D633B846F1}">
-                <asvg:svgBlip xmlns:asvg="http://schemas.microsoft.com/office/drawing/2016/SVG/main" r:embed="rId10"/>
+                <asvg:svgBlip xmlns:asvg="http://schemas.microsoft.com/office/drawing/2016/SVG/main" xmlns="" r:embed="rId10"/>
               </a:ext>
             </a:extLst>
           </a:blip>
@@ -47824,7 +48110,7 @@
                 <a14:useLocalDpi xmlns:a14="http://schemas.microsoft.com/office/drawing/2010/main" val="0"/>
               </a:ext>
               <a:ext uri="{96DAC541-7B7A-43D3-8B79-37D633B846F1}">
-                <asvg:svgBlip xmlns:asvg="http://schemas.microsoft.com/office/drawing/2016/SVG/main" r:embed="rId12"/>
+                <asvg:svgBlip xmlns:asvg="http://schemas.microsoft.com/office/drawing/2016/SVG/main" xmlns="" r:embed="rId12"/>
               </a:ext>
             </a:extLst>
           </a:blip>
@@ -47863,7 +48149,7 @@
                 <a14:useLocalDpi xmlns:a14="http://schemas.microsoft.com/office/drawing/2010/main" val="0"/>
               </a:ext>
               <a:ext uri="{96DAC541-7B7A-43D3-8B79-37D633B846F1}">
-                <asvg:svgBlip xmlns:asvg="http://schemas.microsoft.com/office/drawing/2016/SVG/main" r:embed="rId12"/>
+                <asvg:svgBlip xmlns:asvg="http://schemas.microsoft.com/office/drawing/2016/SVG/main" xmlns="" r:embed="rId12"/>
               </a:ext>
             </a:extLst>
           </a:blip>

</xml_diff>